<commit_message>
Added genres table with data load function. Added SQLTrackModifications = False to avoid warning message.
</commit_message>
<xml_diff>
--- a/projects/01_fyyur/starter_code/fyyur_database_model.pptx
+++ b/projects/01_fyyur/starter_code/fyyur_database_model.pptx
@@ -105,6 +105,11 @@
       </a:defRPr>
     </a:lvl9pPr>
   </p:defaultTextStyle>
+  <p:extLst>
+    <p:ext uri="{EFAFB233-063F-42B5-8137-9DF3F51BA10A}">
+      <p15:sldGuideLst xmlns:p15="http://schemas.microsoft.com/office/powerpoint/2012/main"/>
+    </p:ext>
+  </p:extLst>
 </p:presentation>
 </file>
 
@@ -255,7 +260,7 @@
           <a:p>
             <a:fld id="{ECB4BB09-19D6-4C52-9779-53E877FA861C}" type="datetimeFigureOut">
               <a:rPr lang="en-US" smtClean="0"/>
-              <a:t>8/8/2020</a:t>
+              <a:t>8/9/2020</a:t>
             </a:fld>
             <a:endParaRPr lang="en-US"/>
           </a:p>
@@ -453,7 +458,7 @@
           <a:p>
             <a:fld id="{ECB4BB09-19D6-4C52-9779-53E877FA861C}" type="datetimeFigureOut">
               <a:rPr lang="en-US" smtClean="0"/>
-              <a:t>8/8/2020</a:t>
+              <a:t>8/9/2020</a:t>
             </a:fld>
             <a:endParaRPr lang="en-US"/>
           </a:p>
@@ -661,7 +666,7 @@
           <a:p>
             <a:fld id="{ECB4BB09-19D6-4C52-9779-53E877FA861C}" type="datetimeFigureOut">
               <a:rPr lang="en-US" smtClean="0"/>
-              <a:t>8/8/2020</a:t>
+              <a:t>8/9/2020</a:t>
             </a:fld>
             <a:endParaRPr lang="en-US"/>
           </a:p>
@@ -859,7 +864,7 @@
           <a:p>
             <a:fld id="{ECB4BB09-19D6-4C52-9779-53E877FA861C}" type="datetimeFigureOut">
               <a:rPr lang="en-US" smtClean="0"/>
-              <a:t>8/8/2020</a:t>
+              <a:t>8/9/2020</a:t>
             </a:fld>
             <a:endParaRPr lang="en-US"/>
           </a:p>
@@ -1134,7 +1139,7 @@
           <a:p>
             <a:fld id="{ECB4BB09-19D6-4C52-9779-53E877FA861C}" type="datetimeFigureOut">
               <a:rPr lang="en-US" smtClean="0"/>
-              <a:t>8/8/2020</a:t>
+              <a:t>8/9/2020</a:t>
             </a:fld>
             <a:endParaRPr lang="en-US"/>
           </a:p>
@@ -1399,7 +1404,7 @@
           <a:p>
             <a:fld id="{ECB4BB09-19D6-4C52-9779-53E877FA861C}" type="datetimeFigureOut">
               <a:rPr lang="en-US" smtClean="0"/>
-              <a:t>8/8/2020</a:t>
+              <a:t>8/9/2020</a:t>
             </a:fld>
             <a:endParaRPr lang="en-US"/>
           </a:p>
@@ -1811,7 +1816,7 @@
           <a:p>
             <a:fld id="{ECB4BB09-19D6-4C52-9779-53E877FA861C}" type="datetimeFigureOut">
               <a:rPr lang="en-US" smtClean="0"/>
-              <a:t>8/8/2020</a:t>
+              <a:t>8/9/2020</a:t>
             </a:fld>
             <a:endParaRPr lang="en-US"/>
           </a:p>
@@ -1952,7 +1957,7 @@
           <a:p>
             <a:fld id="{ECB4BB09-19D6-4C52-9779-53E877FA861C}" type="datetimeFigureOut">
               <a:rPr lang="en-US" smtClean="0"/>
-              <a:t>8/8/2020</a:t>
+              <a:t>8/9/2020</a:t>
             </a:fld>
             <a:endParaRPr lang="en-US"/>
           </a:p>
@@ -2065,7 +2070,7 @@
           <a:p>
             <a:fld id="{ECB4BB09-19D6-4C52-9779-53E877FA861C}" type="datetimeFigureOut">
               <a:rPr lang="en-US" smtClean="0"/>
-              <a:t>8/8/2020</a:t>
+              <a:t>8/9/2020</a:t>
             </a:fld>
             <a:endParaRPr lang="en-US"/>
           </a:p>
@@ -2376,7 +2381,7 @@
           <a:p>
             <a:fld id="{ECB4BB09-19D6-4C52-9779-53E877FA861C}" type="datetimeFigureOut">
               <a:rPr lang="en-US" smtClean="0"/>
-              <a:t>8/8/2020</a:t>
+              <a:t>8/9/2020</a:t>
             </a:fld>
             <a:endParaRPr lang="en-US"/>
           </a:p>
@@ -2664,7 +2669,7 @@
           <a:p>
             <a:fld id="{ECB4BB09-19D6-4C52-9779-53E877FA861C}" type="datetimeFigureOut">
               <a:rPr lang="en-US" smtClean="0"/>
-              <a:t>8/8/2020</a:t>
+              <a:t>8/9/2020</a:t>
             </a:fld>
             <a:endParaRPr lang="en-US"/>
           </a:p>
@@ -2905,7 +2910,7 @@
           <a:p>
             <a:fld id="{ECB4BB09-19D6-4C52-9779-53E877FA861C}" type="datetimeFigureOut">
               <a:rPr lang="en-US" smtClean="0"/>
-              <a:t>8/8/2020</a:t>
+              <a:t>8/9/2020</a:t>
             </a:fld>
             <a:endParaRPr lang="en-US"/>
           </a:p>
@@ -3832,7 +3837,7 @@
             <a:pPr algn="ctr"/>
             <a:r>
               <a:rPr lang="en-US" sz="1600" dirty="0"/>
-              <a:t>Genre Types</a:t>
+              <a:t>Genre</a:t>
             </a:r>
           </a:p>
         </p:txBody>

</xml_diff>

<commit_message>
removed genres and updated artist and included load data function
</commit_message>
<xml_diff>
--- a/projects/01_fyyur/starter_code/fyyur_database_model.pptx
+++ b/projects/01_fyyur/starter_code/fyyur_database_model.pptx
@@ -3570,14 +3570,7 @@
             <a:pPr algn="ctr"/>
             <a:r>
               <a:rPr lang="en-US" sz="1600" dirty="0"/>
-              <a:t>(Child to Artist)</a:t>
-            </a:r>
-          </a:p>
-          <a:p>
-            <a:pPr algn="ctr"/>
-            <a:r>
-              <a:rPr lang="en-US" sz="1600" dirty="0"/>
-              <a:t>(Parent to Genre)</a:t>
+              <a:t>(Child)</a:t>
             </a:r>
           </a:p>
         </p:txBody>
@@ -3612,7 +3605,7 @@
           <a:p>
             <a:r>
               <a:rPr lang="en-US" sz="1200" dirty="0"/>
-              <a:t>Artist ID </a:t>
+              <a:t>ID </a:t>
             </a:r>
             <a:r>
               <a:rPr lang="en-US" sz="1200" b="1" dirty="0"/>
@@ -3651,8 +3644,8 @@
         </p:nvSpPr>
         <p:spPr>
           <a:xfrm>
-            <a:off x="642551" y="1832059"/>
-            <a:ext cx="1746553" cy="1394257"/>
+            <a:off x="380999" y="1832059"/>
+            <a:ext cx="2209801" cy="1596941"/>
           </a:xfrm>
           <a:prstGeom prst="rect">
             <a:avLst/>
@@ -3667,7 +3660,7 @@
           <a:p>
             <a:r>
               <a:rPr lang="en-US" sz="1200" dirty="0"/>
-              <a:t>Artist ID </a:t>
+              <a:t>ID </a:t>
             </a:r>
             <a:r>
               <a:rPr lang="en-US" sz="1200" b="1" dirty="0"/>
@@ -3703,7 +3696,7 @@
             </a:r>
             <a:r>
               <a:rPr lang="en-US" sz="1200" dirty="0"/>
-              <a:t>)</a:t>
+              <a:t>)*</a:t>
             </a:r>
           </a:p>
           <a:p>
@@ -3719,125 +3712,40 @@
           </a:p>
           <a:p>
             <a:r>
+              <a:rPr lang="en-US" sz="1200" dirty="0" err="1"/>
+              <a:t>Facebook_link</a:t>
+            </a:r>
+            <a:endParaRPr lang="en-US" sz="1200" dirty="0"/>
+          </a:p>
+          <a:p>
+            <a:r>
+              <a:rPr lang="en-US" sz="1200" dirty="0" err="1"/>
+              <a:t>Image_Link</a:t>
+            </a:r>
+            <a:endParaRPr lang="en-US" sz="1200" dirty="0"/>
+          </a:p>
+          <a:p>
+            <a:r>
               <a:rPr lang="en-US" sz="1200" dirty="0"/>
-              <a:t>Facebook</a:t>
+              <a:t>Comment</a:t>
             </a:r>
           </a:p>
           <a:p>
             <a:r>
               <a:rPr lang="en-US" sz="1200" dirty="0"/>
-              <a:t>Photo</a:t>
+              <a:t>Seeking Venue</a:t>
             </a:r>
           </a:p>
           <a:p>
             <a:r>
               <a:rPr lang="en-US" sz="1200" dirty="0"/>
-              <a:t>Status ID</a:t>
+              <a:t>Seeking Description</a:t>
             </a:r>
           </a:p>
           <a:p>
             <a:r>
               <a:rPr lang="en-US" sz="1200" dirty="0"/>
-              <a:t>Status Comment</a:t>
-            </a:r>
-          </a:p>
-        </p:txBody>
-      </p:sp>
-      <p:sp>
-        <p:nvSpPr>
-          <p:cNvPr id="9" name="Rectangle 8">
-            <a:extLst>
-              <a:ext uri="{FF2B5EF4-FFF2-40B4-BE49-F238E27FC236}">
-                <a16:creationId xmlns:a16="http://schemas.microsoft.com/office/drawing/2014/main" id="{B791EABF-BF48-4399-B908-5C97334C1449}"/>
-              </a:ext>
-            </a:extLst>
-          </p:cNvPr>
-          <p:cNvSpPr/>
-          <p:nvPr/>
-        </p:nvSpPr>
-        <p:spPr>
-          <a:xfrm>
-            <a:off x="8314090" y="1811978"/>
-            <a:ext cx="1507336" cy="939113"/>
-          </a:xfrm>
-          <a:prstGeom prst="rect">
-            <a:avLst/>
-          </a:prstGeom>
-        </p:spPr>
-        <p:style>
-          <a:lnRef idx="2">
-            <a:schemeClr val="accent1">
-              <a:shade val="50000"/>
-            </a:schemeClr>
-          </a:lnRef>
-          <a:fillRef idx="1">
-            <a:schemeClr val="accent1"/>
-          </a:fillRef>
-          <a:effectRef idx="0">
-            <a:schemeClr val="accent1"/>
-          </a:effectRef>
-          <a:fontRef idx="minor">
-            <a:schemeClr val="lt1"/>
-          </a:fontRef>
-        </p:style>
-        <p:txBody>
-          <a:bodyPr rtlCol="0" anchor="ctr"/>
-          <a:lstStyle/>
-          <a:p>
-            <a:pPr algn="ctr"/>
-            <a:r>
-              <a:rPr lang="en-US" sz="1600" dirty="0" err="1"/>
-              <a:t>Venue_Genres</a:t>
-            </a:r>
-            <a:endParaRPr lang="en-US" sz="1600" dirty="0"/>
-          </a:p>
-        </p:txBody>
-      </p:sp>
-      <p:sp>
-        <p:nvSpPr>
-          <p:cNvPr id="10" name="Rectangle 9">
-            <a:extLst>
-              <a:ext uri="{FF2B5EF4-FFF2-40B4-BE49-F238E27FC236}">
-                <a16:creationId xmlns:a16="http://schemas.microsoft.com/office/drawing/2014/main" id="{8F82B0D8-06D9-4563-9E5D-A15769D94D01}"/>
-              </a:ext>
-            </a:extLst>
-          </p:cNvPr>
-          <p:cNvSpPr/>
-          <p:nvPr/>
-        </p:nvSpPr>
-        <p:spPr>
-          <a:xfrm>
-            <a:off x="10154288" y="2634740"/>
-            <a:ext cx="1507336" cy="939113"/>
-          </a:xfrm>
-          <a:prstGeom prst="rect">
-            <a:avLst/>
-          </a:prstGeom>
-        </p:spPr>
-        <p:style>
-          <a:lnRef idx="2">
-            <a:schemeClr val="accent1">
-              <a:shade val="50000"/>
-            </a:schemeClr>
-          </a:lnRef>
-          <a:fillRef idx="1">
-            <a:schemeClr val="accent1"/>
-          </a:fillRef>
-          <a:effectRef idx="0">
-            <a:schemeClr val="accent1"/>
-          </a:effectRef>
-          <a:fontRef idx="minor">
-            <a:schemeClr val="lt1"/>
-          </a:fontRef>
-        </p:style>
-        <p:txBody>
-          <a:bodyPr rtlCol="0" anchor="ctr"/>
-          <a:lstStyle/>
-          <a:p>
-            <a:pPr algn="ctr"/>
-            <a:r>
-              <a:rPr lang="en-US" sz="1600" dirty="0"/>
-              <a:t>Genre</a:t>
+              <a:t>Genres</a:t>
             </a:r>
           </a:p>
         </p:txBody>
@@ -4000,485 +3908,19 @@
       </p:cxnSp>
       <p:sp>
         <p:nvSpPr>
-          <p:cNvPr id="18" name="TextBox 17">
-            <a:extLst>
-              <a:ext uri="{FF2B5EF4-FFF2-40B4-BE49-F238E27FC236}">
-                <a16:creationId xmlns:a16="http://schemas.microsoft.com/office/drawing/2014/main" id="{B36B0726-90B1-4D30-A767-21729E1081F3}"/>
-              </a:ext>
-            </a:extLst>
-          </p:cNvPr>
-          <p:cNvSpPr txBox="1"/>
+          <p:cNvPr id="44" name="Rectangle 43">
+            <a:extLst>
+              <a:ext uri="{FF2B5EF4-FFF2-40B4-BE49-F238E27FC236}">
+                <a16:creationId xmlns:a16="http://schemas.microsoft.com/office/drawing/2014/main" id="{E266A77E-80C2-487C-B5AD-FDD9A01C6A1C}"/>
+              </a:ext>
+            </a:extLst>
+          </p:cNvPr>
+          <p:cNvSpPr/>
           <p:nvPr/>
         </p:nvSpPr>
         <p:spPr>
           <a:xfrm>
-            <a:off x="8364093" y="2738735"/>
-            <a:ext cx="1304940" cy="613414"/>
-          </a:xfrm>
-          <a:prstGeom prst="rect">
-            <a:avLst/>
-          </a:prstGeom>
-          <a:noFill/>
-        </p:spPr>
-        <p:txBody>
-          <a:bodyPr wrap="none" numCol="1" rtlCol="0">
-            <a:noAutofit/>
-          </a:bodyPr>
-          <a:lstStyle/>
-          <a:p>
-            <a:r>
-              <a:rPr lang="en-US" sz="1200" dirty="0"/>
-              <a:t>Venue ID </a:t>
-            </a:r>
-            <a:r>
-              <a:rPr lang="en-US" sz="1200" b="1" dirty="0"/>
-              <a:t>FK</a:t>
-            </a:r>
-          </a:p>
-          <a:p>
-            <a:r>
-              <a:rPr lang="en-US" sz="1200" dirty="0"/>
-              <a:t>Genre ID </a:t>
-            </a:r>
-            <a:r>
-              <a:rPr lang="en-US" sz="1200" b="1" dirty="0"/>
-              <a:t>FK</a:t>
-            </a:r>
-          </a:p>
-          <a:p>
-            <a:r>
-              <a:rPr lang="en-US" sz="1200" dirty="0"/>
-              <a:t>Genre Text (Other)</a:t>
-            </a:r>
-          </a:p>
-        </p:txBody>
-      </p:sp>
-      <p:sp>
-        <p:nvSpPr>
-          <p:cNvPr id="19" name="TextBox 18">
-            <a:extLst>
-              <a:ext uri="{FF2B5EF4-FFF2-40B4-BE49-F238E27FC236}">
-                <a16:creationId xmlns:a16="http://schemas.microsoft.com/office/drawing/2014/main" id="{086AC472-21BD-4E95-8A68-DDE334985465}"/>
-              </a:ext>
-            </a:extLst>
-          </p:cNvPr>
-          <p:cNvSpPr txBox="1"/>
-          <p:nvPr/>
-        </p:nvSpPr>
-        <p:spPr>
-          <a:xfrm>
-            <a:off x="10210800" y="3576935"/>
-            <a:ext cx="1413245" cy="461665"/>
-          </a:xfrm>
-          <a:prstGeom prst="rect">
-            <a:avLst/>
-          </a:prstGeom>
-          <a:noFill/>
-        </p:spPr>
-        <p:txBody>
-          <a:bodyPr wrap="none" numCol="1" rtlCol="0">
-            <a:noAutofit/>
-          </a:bodyPr>
-          <a:lstStyle/>
-          <a:p>
-            <a:r>
-              <a:rPr lang="en-US" sz="1200" dirty="0"/>
-              <a:t>Genre ID </a:t>
-            </a:r>
-            <a:r>
-              <a:rPr lang="en-US" sz="1200" b="1" dirty="0"/>
-              <a:t>PK</a:t>
-            </a:r>
-          </a:p>
-          <a:p>
-            <a:r>
-              <a:rPr lang="en-US" sz="1200" dirty="0"/>
-              <a:t>Genre *</a:t>
-            </a:r>
-          </a:p>
-        </p:txBody>
-      </p:sp>
-      <p:cxnSp>
-        <p:nvCxnSpPr>
-          <p:cNvPr id="21" name="Straight Arrow Connector 20">
-            <a:extLst>
-              <a:ext uri="{FF2B5EF4-FFF2-40B4-BE49-F238E27FC236}">
-                <a16:creationId xmlns:a16="http://schemas.microsoft.com/office/drawing/2014/main" id="{5718D761-658F-4BDC-A8A3-3EDECFEE9D41}"/>
-              </a:ext>
-            </a:extLst>
-          </p:cNvPr>
-          <p:cNvCxnSpPr>
-            <a:cxnSpLocks/>
-            <a:stCxn id="9" idx="1"/>
-            <a:endCxn id="6" idx="3"/>
-          </p:cNvCxnSpPr>
-          <p:nvPr/>
-        </p:nvCxnSpPr>
-        <p:spPr>
-          <a:xfrm rot="10800000">
-            <a:off x="7512910" y="1190369"/>
-            <a:ext cx="801181" cy="1091167"/>
-          </a:xfrm>
-          <a:prstGeom prst="bentConnector3">
-            <a:avLst>
-              <a:gd name="adj1" fmla="val 50000"/>
-            </a:avLst>
-          </a:prstGeom>
-          <a:ln>
-            <a:headEnd type="triangle" w="med" len="med"/>
-            <a:tailEnd type="none" w="med" len="med"/>
-          </a:ln>
-        </p:spPr>
-        <p:style>
-          <a:lnRef idx="1">
-            <a:schemeClr val="accent1"/>
-          </a:lnRef>
-          <a:fillRef idx="0">
-            <a:schemeClr val="accent1"/>
-          </a:fillRef>
-          <a:effectRef idx="0">
-            <a:schemeClr val="accent1"/>
-          </a:effectRef>
-          <a:fontRef idx="minor">
-            <a:schemeClr val="tx1"/>
-          </a:fontRef>
-        </p:style>
-      </p:cxnSp>
-      <p:sp>
-        <p:nvSpPr>
-          <p:cNvPr id="22" name="TextBox 21">
-            <a:extLst>
-              <a:ext uri="{FF2B5EF4-FFF2-40B4-BE49-F238E27FC236}">
-                <a16:creationId xmlns:a16="http://schemas.microsoft.com/office/drawing/2014/main" id="{C11F7281-3858-4D1E-9009-C44A8E84EA8C}"/>
-              </a:ext>
-            </a:extLst>
-          </p:cNvPr>
-          <p:cNvSpPr txBox="1"/>
-          <p:nvPr/>
-        </p:nvSpPr>
-        <p:spPr>
-          <a:xfrm>
-            <a:off x="7532359" y="821035"/>
-            <a:ext cx="301686" cy="369332"/>
-          </a:xfrm>
-          <a:prstGeom prst="rect">
-            <a:avLst/>
-          </a:prstGeom>
-          <a:noFill/>
-        </p:spPr>
-        <p:txBody>
-          <a:bodyPr wrap="none" rtlCol="0">
-            <a:spAutoFit/>
-          </a:bodyPr>
-          <a:lstStyle/>
-          <a:p>
-            <a:r>
-              <a:rPr lang="en-US" dirty="0"/>
-              <a:t>1</a:t>
-            </a:r>
-          </a:p>
-        </p:txBody>
-      </p:sp>
-      <p:sp>
-        <p:nvSpPr>
-          <p:cNvPr id="23" name="TextBox 22">
-            <a:extLst>
-              <a:ext uri="{FF2B5EF4-FFF2-40B4-BE49-F238E27FC236}">
-                <a16:creationId xmlns:a16="http://schemas.microsoft.com/office/drawing/2014/main" id="{1CFDE85C-092D-474A-8E92-E2A27029D91C}"/>
-              </a:ext>
-            </a:extLst>
-          </p:cNvPr>
-          <p:cNvSpPr txBox="1"/>
-          <p:nvPr/>
-        </p:nvSpPr>
-        <p:spPr>
-          <a:xfrm>
-            <a:off x="7936372" y="2308307"/>
-            <a:ext cx="367854" cy="369332"/>
-          </a:xfrm>
-          <a:prstGeom prst="rect">
-            <a:avLst/>
-          </a:prstGeom>
-          <a:noFill/>
-        </p:spPr>
-        <p:txBody>
-          <a:bodyPr wrap="square" rtlCol="0">
-            <a:spAutoFit/>
-          </a:bodyPr>
-          <a:lstStyle/>
-          <a:p>
-            <a:r>
-              <a:rPr lang="en-US" dirty="0"/>
-              <a:t>M</a:t>
-            </a:r>
-          </a:p>
-        </p:txBody>
-      </p:sp>
-      <p:cxnSp>
-        <p:nvCxnSpPr>
-          <p:cNvPr id="24" name="Straight Arrow Connector 20">
-            <a:extLst>
-              <a:ext uri="{FF2B5EF4-FFF2-40B4-BE49-F238E27FC236}">
-                <a16:creationId xmlns:a16="http://schemas.microsoft.com/office/drawing/2014/main" id="{940B1683-5F77-4EEA-BDBB-1D055541AC5C}"/>
-              </a:ext>
-            </a:extLst>
-          </p:cNvPr>
-          <p:cNvCxnSpPr>
-            <a:cxnSpLocks/>
-            <a:stCxn id="10" idx="0"/>
-            <a:endCxn id="9" idx="3"/>
-          </p:cNvCxnSpPr>
-          <p:nvPr/>
-        </p:nvCxnSpPr>
-        <p:spPr>
-          <a:xfrm rot="16200000" flipV="1">
-            <a:off x="10188089" y="1914873"/>
-            <a:ext cx="353205" cy="1086530"/>
-          </a:xfrm>
-          <a:prstGeom prst="bentConnector2">
-            <a:avLst/>
-          </a:prstGeom>
-          <a:ln>
-            <a:tailEnd type="triangle"/>
-          </a:ln>
-        </p:spPr>
-        <p:style>
-          <a:lnRef idx="1">
-            <a:schemeClr val="accent1"/>
-          </a:lnRef>
-          <a:fillRef idx="0">
-            <a:schemeClr val="accent1"/>
-          </a:fillRef>
-          <a:effectRef idx="0">
-            <a:schemeClr val="accent1"/>
-          </a:effectRef>
-          <a:fontRef idx="minor">
-            <a:schemeClr val="tx1"/>
-          </a:fontRef>
-        </p:style>
-      </p:cxnSp>
-      <p:sp>
-        <p:nvSpPr>
-          <p:cNvPr id="35" name="TextBox 34">
-            <a:extLst>
-              <a:ext uri="{FF2B5EF4-FFF2-40B4-BE49-F238E27FC236}">
-                <a16:creationId xmlns:a16="http://schemas.microsoft.com/office/drawing/2014/main" id="{B3239546-89A1-48A0-9EDE-EE02E7B29EA3}"/>
-              </a:ext>
-            </a:extLst>
-          </p:cNvPr>
-          <p:cNvSpPr txBox="1"/>
-          <p:nvPr/>
-        </p:nvSpPr>
-        <p:spPr>
-          <a:xfrm>
-            <a:off x="10917821" y="2275357"/>
-            <a:ext cx="301686" cy="369332"/>
-          </a:xfrm>
-          <a:prstGeom prst="rect">
-            <a:avLst/>
-          </a:prstGeom>
-          <a:noFill/>
-        </p:spPr>
-        <p:txBody>
-          <a:bodyPr wrap="none" rtlCol="0">
-            <a:spAutoFit/>
-          </a:bodyPr>
-          <a:lstStyle/>
-          <a:p>
-            <a:r>
-              <a:rPr lang="en-US" dirty="0"/>
-              <a:t>1</a:t>
-            </a:r>
-          </a:p>
-        </p:txBody>
-      </p:sp>
-      <p:sp>
-        <p:nvSpPr>
-          <p:cNvPr id="36" name="TextBox 35">
-            <a:extLst>
-              <a:ext uri="{FF2B5EF4-FFF2-40B4-BE49-F238E27FC236}">
-                <a16:creationId xmlns:a16="http://schemas.microsoft.com/office/drawing/2014/main" id="{506F962E-0C1D-43CE-9049-A50F8E9BF030}"/>
-              </a:ext>
-            </a:extLst>
-          </p:cNvPr>
-          <p:cNvSpPr txBox="1"/>
-          <p:nvPr/>
-        </p:nvSpPr>
-        <p:spPr>
-          <a:xfrm>
-            <a:off x="9792485" y="1980519"/>
-            <a:ext cx="381836" cy="369332"/>
-          </a:xfrm>
-          <a:prstGeom prst="rect">
-            <a:avLst/>
-          </a:prstGeom>
-          <a:noFill/>
-        </p:spPr>
-        <p:txBody>
-          <a:bodyPr wrap="none" rtlCol="0">
-            <a:spAutoFit/>
-          </a:bodyPr>
-          <a:lstStyle/>
-          <a:p>
-            <a:r>
-              <a:rPr lang="en-US" dirty="0"/>
-              <a:t>M</a:t>
-            </a:r>
-          </a:p>
-        </p:txBody>
-      </p:sp>
-      <p:sp>
-        <p:nvSpPr>
-          <p:cNvPr id="38" name="Rectangle 37">
-            <a:extLst>
-              <a:ext uri="{FF2B5EF4-FFF2-40B4-BE49-F238E27FC236}">
-                <a16:creationId xmlns:a16="http://schemas.microsoft.com/office/drawing/2014/main" id="{5B805332-9960-4F28-82BF-01C233B20840}"/>
-              </a:ext>
-            </a:extLst>
-          </p:cNvPr>
-          <p:cNvSpPr/>
-          <p:nvPr/>
-        </p:nvSpPr>
-        <p:spPr>
-          <a:xfrm>
-            <a:off x="8077200" y="3538976"/>
-            <a:ext cx="1507336" cy="1033024"/>
-          </a:xfrm>
-          <a:prstGeom prst="rect">
-            <a:avLst/>
-          </a:prstGeom>
-        </p:spPr>
-        <p:style>
-          <a:lnRef idx="2">
-            <a:schemeClr val="accent1">
-              <a:shade val="50000"/>
-            </a:schemeClr>
-          </a:lnRef>
-          <a:fillRef idx="1">
-            <a:schemeClr val="accent1"/>
-          </a:fillRef>
-          <a:effectRef idx="0">
-            <a:schemeClr val="accent1"/>
-          </a:effectRef>
-          <a:fontRef idx="minor">
-            <a:schemeClr val="lt1"/>
-          </a:fontRef>
-        </p:style>
-        <p:txBody>
-          <a:bodyPr rtlCol="0" anchor="ctr"/>
-          <a:lstStyle/>
-          <a:p>
-            <a:pPr algn="ctr"/>
-            <a:r>
-              <a:rPr lang="en-US" sz="1600" dirty="0"/>
-              <a:t>Status Types</a:t>
-            </a:r>
-          </a:p>
-        </p:txBody>
-      </p:sp>
-      <p:cxnSp>
-        <p:nvCxnSpPr>
-          <p:cNvPr id="40" name="Connector: Elbow 39">
-            <a:extLst>
-              <a:ext uri="{FF2B5EF4-FFF2-40B4-BE49-F238E27FC236}">
-                <a16:creationId xmlns:a16="http://schemas.microsoft.com/office/drawing/2014/main" id="{C7102758-D54B-4C31-9C38-2D1B09265768}"/>
-              </a:ext>
-            </a:extLst>
-          </p:cNvPr>
-          <p:cNvCxnSpPr>
-            <a:cxnSpLocks/>
-            <a:stCxn id="38" idx="1"/>
-          </p:cNvCxnSpPr>
-          <p:nvPr/>
-        </p:nvCxnSpPr>
-        <p:spPr>
-          <a:xfrm rot="10800000">
-            <a:off x="7377354" y="1852344"/>
-            <a:ext cx="699846" cy="2203145"/>
-          </a:xfrm>
-          <a:prstGeom prst="bentConnector2">
-            <a:avLst/>
-          </a:prstGeom>
-          <a:ln>
-            <a:tailEnd type="triangle"/>
-          </a:ln>
-        </p:spPr>
-        <p:style>
-          <a:lnRef idx="1">
-            <a:schemeClr val="accent1"/>
-          </a:lnRef>
-          <a:fillRef idx="0">
-            <a:schemeClr val="accent1"/>
-          </a:fillRef>
-          <a:effectRef idx="0">
-            <a:schemeClr val="accent1"/>
-          </a:effectRef>
-          <a:fontRef idx="minor">
-            <a:schemeClr val="tx1"/>
-          </a:fontRef>
-        </p:style>
-      </p:cxnSp>
-      <p:sp>
-        <p:nvSpPr>
-          <p:cNvPr id="43" name="TextBox 42">
-            <a:extLst>
-              <a:ext uri="{FF2B5EF4-FFF2-40B4-BE49-F238E27FC236}">
-                <a16:creationId xmlns:a16="http://schemas.microsoft.com/office/drawing/2014/main" id="{F4BC58F1-730B-41F3-A268-48168AC926BD}"/>
-              </a:ext>
-            </a:extLst>
-          </p:cNvPr>
-          <p:cNvSpPr txBox="1"/>
-          <p:nvPr/>
-        </p:nvSpPr>
-        <p:spPr>
-          <a:xfrm>
-            <a:off x="8314089" y="4567535"/>
-            <a:ext cx="1354943" cy="461665"/>
-          </a:xfrm>
-          <a:prstGeom prst="rect">
-            <a:avLst/>
-          </a:prstGeom>
-          <a:noFill/>
-        </p:spPr>
-        <p:txBody>
-          <a:bodyPr wrap="none" numCol="1" rtlCol="0">
-            <a:noAutofit/>
-          </a:bodyPr>
-          <a:lstStyle/>
-          <a:p>
-            <a:r>
-              <a:rPr lang="en-US" sz="1200" dirty="0"/>
-              <a:t>Status ID</a:t>
-            </a:r>
-          </a:p>
-          <a:p>
-            <a:r>
-              <a:rPr lang="en-US" sz="1200" dirty="0"/>
-              <a:t>Status</a:t>
-            </a:r>
-            <a:r>
-              <a:rPr lang="en-US" sz="1200" baseline="30000" dirty="0"/>
-              <a:t>2 *</a:t>
-            </a:r>
-            <a:endParaRPr lang="en-US" sz="1200" dirty="0"/>
-          </a:p>
-        </p:txBody>
-      </p:sp>
-      <p:sp>
-        <p:nvSpPr>
-          <p:cNvPr id="44" name="Rectangle 43">
-            <a:extLst>
-              <a:ext uri="{FF2B5EF4-FFF2-40B4-BE49-F238E27FC236}">
-                <a16:creationId xmlns:a16="http://schemas.microsoft.com/office/drawing/2014/main" id="{E266A77E-80C2-487C-B5AD-FDD9A01C6A1C}"/>
-              </a:ext>
-            </a:extLst>
-          </p:cNvPr>
-          <p:cNvSpPr/>
-          <p:nvPr/>
-        </p:nvSpPr>
-        <p:spPr>
-          <a:xfrm>
-            <a:off x="6781800" y="5153494"/>
+            <a:off x="6781800" y="4696294"/>
             <a:ext cx="5105400" cy="1200329"/>
           </a:xfrm>
           <a:prstGeom prst="rect">
@@ -4596,7 +4038,7 @@
         </p:nvSpPr>
         <p:spPr>
           <a:xfrm>
-            <a:off x="380999" y="4343401"/>
+            <a:off x="380999" y="3886201"/>
             <a:ext cx="2063127" cy="2438400"/>
           </a:xfrm>
           <a:prstGeom prst="rect">
@@ -4750,7 +4192,7 @@
         </p:nvSpPr>
         <p:spPr>
           <a:xfrm>
-            <a:off x="2590800" y="4343400"/>
+            <a:off x="2590800" y="3886200"/>
             <a:ext cx="3733800" cy="2438400"/>
           </a:xfrm>
           <a:prstGeom prst="rect">
@@ -5096,8 +4538,8 @@
         </p:nvSpPr>
         <p:spPr>
           <a:xfrm>
-            <a:off x="5607493" y="1822622"/>
-            <a:ext cx="1880416" cy="1410731"/>
+            <a:off x="5486400" y="1822622"/>
+            <a:ext cx="2462984" cy="1410731"/>
           </a:xfrm>
           <a:prstGeom prst="rect">
             <a:avLst/>
@@ -5112,7 +4554,7 @@
           <a:p>
             <a:r>
               <a:rPr lang="en-US" sz="1200" dirty="0"/>
-              <a:t>Venue ID </a:t>
+              <a:t>ID </a:t>
             </a:r>
             <a:r>
               <a:rPr lang="en-US" sz="1200" b="1" dirty="0"/>
@@ -5170,20 +4612,22 @@
           </a:p>
           <a:p>
             <a:r>
+              <a:rPr lang="en-US" sz="1200" dirty="0" err="1"/>
+              <a:t>Facebook_link</a:t>
+            </a:r>
+            <a:endParaRPr lang="en-US" sz="1200" dirty="0"/>
+          </a:p>
+          <a:p>
+            <a:r>
+              <a:rPr lang="en-US" sz="1200" dirty="0" err="1"/>
+              <a:t>Image_link</a:t>
+            </a:r>
+            <a:endParaRPr lang="en-US" sz="1200" dirty="0"/>
+          </a:p>
+          <a:p>
+            <a:r>
               <a:rPr lang="en-US" sz="1200" dirty="0"/>
-              <a:t>Facebook</a:t>
-            </a:r>
-          </a:p>
-          <a:p>
-            <a:r>
-              <a:rPr lang="en-US" sz="1200" dirty="0"/>
-              <a:t>Photo</a:t>
-            </a:r>
-          </a:p>
-          <a:p>
-            <a:r>
-              <a:rPr lang="en-US" sz="1200" dirty="0"/>
-              <a:t>Status ID</a:t>
+              <a:t>Status</a:t>
             </a:r>
           </a:p>
           <a:p>
@@ -5196,394 +4640,19 @@
       </p:sp>
       <p:sp>
         <p:nvSpPr>
-          <p:cNvPr id="50" name="TextBox 49">
-            <a:extLst>
-              <a:ext uri="{FF2B5EF4-FFF2-40B4-BE49-F238E27FC236}">
-                <a16:creationId xmlns:a16="http://schemas.microsoft.com/office/drawing/2014/main" id="{C56206FE-D3BF-4735-87BD-3FDA7666B9BA}"/>
-              </a:ext>
-            </a:extLst>
-          </p:cNvPr>
-          <p:cNvSpPr txBox="1"/>
+          <p:cNvPr id="73" name="Rectangle 72">
+            <a:extLst>
+              <a:ext uri="{FF2B5EF4-FFF2-40B4-BE49-F238E27FC236}">
+                <a16:creationId xmlns:a16="http://schemas.microsoft.com/office/drawing/2014/main" id="{5BDCD9EA-A92D-40BE-8448-2EAF1E933FE6}"/>
+              </a:ext>
+            </a:extLst>
+          </p:cNvPr>
+          <p:cNvSpPr/>
           <p:nvPr/>
         </p:nvSpPr>
         <p:spPr>
           <a:xfrm>
-            <a:off x="7377355" y="1852345"/>
-            <a:ext cx="301686" cy="369332"/>
-          </a:xfrm>
-          <a:prstGeom prst="rect">
-            <a:avLst/>
-          </a:prstGeom>
-          <a:noFill/>
-        </p:spPr>
-        <p:txBody>
-          <a:bodyPr wrap="none" rtlCol="0">
-            <a:spAutoFit/>
-          </a:bodyPr>
-          <a:lstStyle/>
-          <a:p>
-            <a:r>
-              <a:rPr lang="en-US" dirty="0"/>
-              <a:t>1</a:t>
-            </a:r>
-          </a:p>
-        </p:txBody>
-      </p:sp>
-      <p:sp>
-        <p:nvSpPr>
-          <p:cNvPr id="51" name="TextBox 50">
-            <a:extLst>
-              <a:ext uri="{FF2B5EF4-FFF2-40B4-BE49-F238E27FC236}">
-                <a16:creationId xmlns:a16="http://schemas.microsoft.com/office/drawing/2014/main" id="{222B1A3C-FAD8-47D4-B9FC-C69FE66ED05E}"/>
-              </a:ext>
-            </a:extLst>
-          </p:cNvPr>
-          <p:cNvSpPr txBox="1"/>
-          <p:nvPr/>
-        </p:nvSpPr>
-        <p:spPr>
-          <a:xfrm>
-            <a:off x="7775514" y="3733800"/>
-            <a:ext cx="301686" cy="369332"/>
-          </a:xfrm>
-          <a:prstGeom prst="rect">
-            <a:avLst/>
-          </a:prstGeom>
-          <a:noFill/>
-        </p:spPr>
-        <p:txBody>
-          <a:bodyPr wrap="none" rtlCol="0">
-            <a:spAutoFit/>
-          </a:bodyPr>
-          <a:lstStyle/>
-          <a:p>
-            <a:r>
-              <a:rPr lang="en-US" dirty="0"/>
-              <a:t>1</a:t>
-            </a:r>
-          </a:p>
-        </p:txBody>
-      </p:sp>
-      <p:cxnSp>
-        <p:nvCxnSpPr>
-          <p:cNvPr id="52" name="Connector: Elbow 51">
-            <a:extLst>
-              <a:ext uri="{FF2B5EF4-FFF2-40B4-BE49-F238E27FC236}">
-                <a16:creationId xmlns:a16="http://schemas.microsoft.com/office/drawing/2014/main" id="{D62CC34A-0EE4-4399-978D-9CD1F55FBFB1}"/>
-              </a:ext>
-            </a:extLst>
-          </p:cNvPr>
-          <p:cNvCxnSpPr>
-            <a:cxnSpLocks/>
-            <a:stCxn id="38" idx="1"/>
-          </p:cNvCxnSpPr>
-          <p:nvPr/>
-        </p:nvCxnSpPr>
-        <p:spPr>
-          <a:xfrm rot="10800000">
-            <a:off x="2364260" y="1761166"/>
-            <a:ext cx="5712940" cy="2294322"/>
-          </a:xfrm>
-          <a:prstGeom prst="bentConnector3">
-            <a:avLst>
-              <a:gd name="adj1" fmla="val 89593"/>
-            </a:avLst>
-          </a:prstGeom>
-          <a:ln>
-            <a:tailEnd type="triangle"/>
-          </a:ln>
-        </p:spPr>
-        <p:style>
-          <a:lnRef idx="1">
-            <a:schemeClr val="accent1"/>
-          </a:lnRef>
-          <a:fillRef idx="0">
-            <a:schemeClr val="accent1"/>
-          </a:fillRef>
-          <a:effectRef idx="0">
-            <a:schemeClr val="accent1"/>
-          </a:effectRef>
-          <a:fontRef idx="minor">
-            <a:schemeClr val="tx1"/>
-          </a:fontRef>
-        </p:style>
-      </p:cxnSp>
-      <p:sp>
-        <p:nvSpPr>
-          <p:cNvPr id="57" name="TextBox 56">
-            <a:extLst>
-              <a:ext uri="{FF2B5EF4-FFF2-40B4-BE49-F238E27FC236}">
-                <a16:creationId xmlns:a16="http://schemas.microsoft.com/office/drawing/2014/main" id="{9EBB60FE-7AA6-4943-AA8E-1B0D4EF67603}"/>
-              </a:ext>
-            </a:extLst>
-          </p:cNvPr>
-          <p:cNvSpPr txBox="1"/>
-          <p:nvPr/>
-        </p:nvSpPr>
-        <p:spPr>
-          <a:xfrm>
-            <a:off x="2444126" y="1391834"/>
-            <a:ext cx="301686" cy="369332"/>
-          </a:xfrm>
-          <a:prstGeom prst="rect">
-            <a:avLst/>
-          </a:prstGeom>
-          <a:noFill/>
-        </p:spPr>
-        <p:txBody>
-          <a:bodyPr wrap="none" rtlCol="0">
-            <a:spAutoFit/>
-          </a:bodyPr>
-          <a:lstStyle/>
-          <a:p>
-            <a:r>
-              <a:rPr lang="en-US" dirty="0"/>
-              <a:t>1</a:t>
-            </a:r>
-          </a:p>
-        </p:txBody>
-      </p:sp>
-      <p:sp>
-        <p:nvSpPr>
-          <p:cNvPr id="60" name="Rectangle 59">
-            <a:extLst>
-              <a:ext uri="{FF2B5EF4-FFF2-40B4-BE49-F238E27FC236}">
-                <a16:creationId xmlns:a16="http://schemas.microsoft.com/office/drawing/2014/main" id="{2AEE810C-91A9-46EE-9772-D01E3E9BBFA4}"/>
-              </a:ext>
-            </a:extLst>
-          </p:cNvPr>
-          <p:cNvSpPr/>
-          <p:nvPr/>
-        </p:nvSpPr>
-        <p:spPr>
-          <a:xfrm>
-            <a:off x="8314090" y="271807"/>
-            <a:ext cx="1507336" cy="939113"/>
-          </a:xfrm>
-          <a:prstGeom prst="rect">
-            <a:avLst/>
-          </a:prstGeom>
-        </p:spPr>
-        <p:style>
-          <a:lnRef idx="2">
-            <a:schemeClr val="accent1">
-              <a:shade val="50000"/>
-            </a:schemeClr>
-          </a:lnRef>
-          <a:fillRef idx="1">
-            <a:schemeClr val="accent1"/>
-          </a:fillRef>
-          <a:effectRef idx="0">
-            <a:schemeClr val="accent1"/>
-          </a:effectRef>
-          <a:fontRef idx="minor">
-            <a:schemeClr val="lt1"/>
-          </a:fontRef>
-        </p:style>
-        <p:txBody>
-          <a:bodyPr rtlCol="0" anchor="ctr"/>
-          <a:lstStyle/>
-          <a:p>
-            <a:pPr algn="ctr"/>
-            <a:r>
-              <a:rPr lang="en-US" sz="1600" dirty="0" err="1"/>
-              <a:t>Artist_Genres</a:t>
-            </a:r>
-            <a:endParaRPr lang="en-US" sz="1600" dirty="0"/>
-          </a:p>
-        </p:txBody>
-      </p:sp>
-      <p:cxnSp>
-        <p:nvCxnSpPr>
-          <p:cNvPr id="61" name="Straight Arrow Connector 20">
-            <a:extLst>
-              <a:ext uri="{FF2B5EF4-FFF2-40B4-BE49-F238E27FC236}">
-                <a16:creationId xmlns:a16="http://schemas.microsoft.com/office/drawing/2014/main" id="{AEA2028C-D717-4584-8CAA-A8FDCA983D95}"/>
-              </a:ext>
-            </a:extLst>
-          </p:cNvPr>
-          <p:cNvCxnSpPr>
-            <a:cxnSpLocks/>
-            <a:stCxn id="10" idx="0"/>
-            <a:endCxn id="60" idx="3"/>
-          </p:cNvCxnSpPr>
-          <p:nvPr/>
-        </p:nvCxnSpPr>
-        <p:spPr>
-          <a:xfrm rot="16200000" flipV="1">
-            <a:off x="9418003" y="1144787"/>
-            <a:ext cx="1893376" cy="1086530"/>
-          </a:xfrm>
-          <a:prstGeom prst="bentConnector2">
-            <a:avLst/>
-          </a:prstGeom>
-          <a:ln>
-            <a:tailEnd type="triangle"/>
-          </a:ln>
-        </p:spPr>
-        <p:style>
-          <a:lnRef idx="1">
-            <a:schemeClr val="accent1"/>
-          </a:lnRef>
-          <a:fillRef idx="0">
-            <a:schemeClr val="accent1"/>
-          </a:fillRef>
-          <a:effectRef idx="0">
-            <a:schemeClr val="accent1"/>
-          </a:effectRef>
-          <a:fontRef idx="minor">
-            <a:schemeClr val="tx1"/>
-          </a:fontRef>
-        </p:style>
-      </p:cxnSp>
-      <p:sp>
-        <p:nvSpPr>
-          <p:cNvPr id="65" name="TextBox 64">
-            <a:extLst>
-              <a:ext uri="{FF2B5EF4-FFF2-40B4-BE49-F238E27FC236}">
-                <a16:creationId xmlns:a16="http://schemas.microsoft.com/office/drawing/2014/main" id="{75DE327D-E3E2-4988-944A-48ED930A18BA}"/>
-              </a:ext>
-            </a:extLst>
-          </p:cNvPr>
-          <p:cNvSpPr txBox="1"/>
-          <p:nvPr/>
-        </p:nvSpPr>
-        <p:spPr>
-          <a:xfrm>
-            <a:off x="9829800" y="392668"/>
-            <a:ext cx="381836" cy="369332"/>
-          </a:xfrm>
-          <a:prstGeom prst="rect">
-            <a:avLst/>
-          </a:prstGeom>
-          <a:noFill/>
-        </p:spPr>
-        <p:txBody>
-          <a:bodyPr wrap="none" rtlCol="0">
-            <a:spAutoFit/>
-          </a:bodyPr>
-          <a:lstStyle/>
-          <a:p>
-            <a:r>
-              <a:rPr lang="en-US" dirty="0"/>
-              <a:t>M</a:t>
-            </a:r>
-          </a:p>
-        </p:txBody>
-      </p:sp>
-      <p:cxnSp>
-        <p:nvCxnSpPr>
-          <p:cNvPr id="66" name="Straight Arrow Connector 20">
-            <a:extLst>
-              <a:ext uri="{FF2B5EF4-FFF2-40B4-BE49-F238E27FC236}">
-                <a16:creationId xmlns:a16="http://schemas.microsoft.com/office/drawing/2014/main" id="{19620F53-6F53-448A-8B21-48731CAD4AB6}"/>
-              </a:ext>
-            </a:extLst>
-          </p:cNvPr>
-          <p:cNvCxnSpPr>
-            <a:cxnSpLocks/>
-            <a:endCxn id="4" idx="0"/>
-          </p:cNvCxnSpPr>
-          <p:nvPr/>
-        </p:nvCxnSpPr>
-        <p:spPr>
-          <a:xfrm rot="10800000" flipV="1">
-            <a:off x="1503407" y="406977"/>
-            <a:ext cx="6810683" cy="161434"/>
-          </a:xfrm>
-          <a:prstGeom prst="bentConnector2">
-            <a:avLst/>
-          </a:prstGeom>
-          <a:ln>
-            <a:tailEnd type="triangle"/>
-          </a:ln>
-        </p:spPr>
-        <p:style>
-          <a:lnRef idx="1">
-            <a:schemeClr val="accent1"/>
-          </a:lnRef>
-          <a:fillRef idx="0">
-            <a:schemeClr val="accent1"/>
-          </a:fillRef>
-          <a:effectRef idx="0">
-            <a:schemeClr val="accent1"/>
-          </a:effectRef>
-          <a:fontRef idx="minor">
-            <a:schemeClr val="tx1"/>
-          </a:fontRef>
-        </p:style>
-      </p:cxnSp>
-      <p:sp>
-        <p:nvSpPr>
-          <p:cNvPr id="72" name="TextBox 71">
-            <a:extLst>
-              <a:ext uri="{FF2B5EF4-FFF2-40B4-BE49-F238E27FC236}">
-                <a16:creationId xmlns:a16="http://schemas.microsoft.com/office/drawing/2014/main" id="{7B588419-6EE0-4976-B550-328EEA988005}"/>
-              </a:ext>
-            </a:extLst>
-          </p:cNvPr>
-          <p:cNvSpPr txBox="1"/>
-          <p:nvPr/>
-        </p:nvSpPr>
-        <p:spPr>
-          <a:xfrm>
-            <a:off x="8305800" y="1143000"/>
-            <a:ext cx="1442074" cy="618166"/>
-          </a:xfrm>
-          <a:prstGeom prst="rect">
-            <a:avLst/>
-          </a:prstGeom>
-          <a:noFill/>
-        </p:spPr>
-        <p:txBody>
-          <a:bodyPr wrap="none" numCol="1" rtlCol="0">
-            <a:noAutofit/>
-          </a:bodyPr>
-          <a:lstStyle/>
-          <a:p>
-            <a:r>
-              <a:rPr lang="en-US" sz="1200" dirty="0"/>
-              <a:t>Artist ID </a:t>
-            </a:r>
-            <a:r>
-              <a:rPr lang="en-US" sz="1200" b="1" dirty="0"/>
-              <a:t>FK</a:t>
-            </a:r>
-          </a:p>
-          <a:p>
-            <a:r>
-              <a:rPr lang="en-US" sz="1200" dirty="0"/>
-              <a:t>Genre ID </a:t>
-            </a:r>
-            <a:r>
-              <a:rPr lang="en-US" sz="1200" b="1" dirty="0"/>
-              <a:t>FK</a:t>
-            </a:r>
-          </a:p>
-          <a:p>
-            <a:r>
-              <a:rPr lang="en-US" sz="1200" dirty="0"/>
-              <a:t>Genre Text (Other)</a:t>
-            </a:r>
-            <a:endParaRPr lang="en-US" sz="1200" b="1" dirty="0"/>
-          </a:p>
-        </p:txBody>
-      </p:sp>
-      <p:sp>
-        <p:nvSpPr>
-          <p:cNvPr id="73" name="Rectangle 72">
-            <a:extLst>
-              <a:ext uri="{FF2B5EF4-FFF2-40B4-BE49-F238E27FC236}">
-                <a16:creationId xmlns:a16="http://schemas.microsoft.com/office/drawing/2014/main" id="{5BDCD9EA-A92D-40BE-8448-2EAF1E933FE6}"/>
-              </a:ext>
-            </a:extLst>
-          </p:cNvPr>
-          <p:cNvSpPr/>
-          <p:nvPr/>
-        </p:nvSpPr>
-        <p:spPr>
-          <a:xfrm>
-            <a:off x="685800" y="3283751"/>
+            <a:off x="9601200" y="783223"/>
             <a:ext cx="1703304" cy="602450"/>
           </a:xfrm>
           <a:prstGeom prst="rect">
@@ -5640,7 +4709,7 @@
         </p:nvSpPr>
         <p:spPr>
           <a:xfrm>
-            <a:off x="666891" y="3909979"/>
+            <a:off x="9582291" y="1409451"/>
             <a:ext cx="1659790" cy="509621"/>
           </a:xfrm>
           <a:prstGeom prst="rect">
@@ -5660,7 +4729,7 @@
             </a:r>
             <a:r>
               <a:rPr lang="en-US" sz="1200" b="1" dirty="0"/>
-              <a:t>PK</a:t>
+              <a:t>FK</a:t>
             </a:r>
           </a:p>
           <a:p>
@@ -5682,19 +4751,19 @@
           </p:cNvPr>
           <p:cNvCxnSpPr>
             <a:cxnSpLocks/>
-            <a:stCxn id="73" idx="1"/>
-            <a:endCxn id="4" idx="1"/>
+            <a:stCxn id="73" idx="0"/>
+            <a:endCxn id="4" idx="0"/>
           </p:cNvCxnSpPr>
           <p:nvPr/>
         </p:nvCxnSpPr>
         <p:spPr>
-          <a:xfrm rot="10800000">
-            <a:off x="642552" y="1190368"/>
-            <a:ext cx="43249" cy="2394608"/>
+          <a:xfrm rot="16200000" flipV="1">
+            <a:off x="5870723" y="-3798906"/>
+            <a:ext cx="214812" cy="8949446"/>
           </a:xfrm>
           <a:prstGeom prst="bentConnector3">
             <a:avLst>
-              <a:gd name="adj1" fmla="val 628567"/>
+              <a:gd name="adj1" fmla="val 206419"/>
             </a:avLst>
           </a:prstGeom>
           <a:ln>
@@ -5730,7 +4799,7 @@
         </p:nvSpPr>
         <p:spPr>
           <a:xfrm>
-            <a:off x="260999" y="773668"/>
+            <a:off x="1197602" y="254569"/>
             <a:ext cx="301686" cy="369332"/>
           </a:xfrm>
           <a:prstGeom prst="rect">
@@ -5765,7 +4834,7 @@
         </p:nvSpPr>
         <p:spPr>
           <a:xfrm>
-            <a:off x="387211" y="3193480"/>
+            <a:off x="10428137" y="451703"/>
             <a:ext cx="367854" cy="369332"/>
           </a:xfrm>
           <a:prstGeom prst="rect">

</xml_diff>